<commit_message>
changed color to neural
</commit_message>
<xml_diff>
--- a/graphics.pptx
+++ b/graphics.pptx
@@ -5060,9 +5060,9 @@
             <a:avLst/>
           </a:prstGeom>
           <a:solidFill>
-            <a:srgbClr val="FF8F8F">
+            <a:schemeClr val="accent5">
               <a:alpha val="50000"/>
-            </a:srgbClr>
+            </a:schemeClr>
           </a:solidFill>
           <a:ln>
             <a:noFill/>
@@ -5091,8 +5091,8 @@
           </a:p>
         </p:txBody>
       </p:sp>
-      <mc:AlternateContent xmlns:mc="http://schemas.openxmlformats.org/markup-compatibility/2006">
-        <mc:Choice xmlns:a14="http://schemas.microsoft.com/office/drawing/2010/main" Requires="a14">
+      <mc:AlternateContent xmlns:mc="http://schemas.openxmlformats.org/markup-compatibility/2006" xmlns:a14="http://schemas.microsoft.com/office/drawing/2010/main">
+        <mc:Choice Requires="a14">
           <p:sp>
             <p:nvSpPr>
               <p:cNvPr id="117" name="TextBox 116">
@@ -5121,6 +5121,7 @@
               </a:bodyPr>
               <a:lstStyle/>
               <a:p>
+                <a:pPr/>
                 <a14:m>
                   <m:oMathPara xmlns:m="http://schemas.openxmlformats.org/officeDocument/2006/math">
                     <m:oMathParaPr>
@@ -5189,7 +5190,7 @@
             </p:txBody>
           </p:sp>
         </mc:Choice>
-        <mc:Fallback>
+        <mc:Fallback xmlns="">
           <p:sp>
             <p:nvSpPr>
               <p:cNvPr id="117" name="TextBox 116">
@@ -5234,8 +5235,8 @@
           </p:sp>
         </mc:Fallback>
       </mc:AlternateContent>
-      <mc:AlternateContent xmlns:mc="http://schemas.openxmlformats.org/markup-compatibility/2006">
-        <mc:Choice xmlns:a14="http://schemas.microsoft.com/office/drawing/2010/main" Requires="a14">
+      <mc:AlternateContent xmlns:mc="http://schemas.openxmlformats.org/markup-compatibility/2006" xmlns:a14="http://schemas.microsoft.com/office/drawing/2010/main">
+        <mc:Choice Requires="a14">
           <p:sp>
             <p:nvSpPr>
               <p:cNvPr id="118" name="TextBox 117">
@@ -5264,6 +5265,7 @@
               </a:bodyPr>
               <a:lstStyle/>
               <a:p>
+                <a:pPr/>
                 <a14:m>
                   <m:oMathPara xmlns:m="http://schemas.openxmlformats.org/officeDocument/2006/math">
                     <m:oMathParaPr>
@@ -5332,7 +5334,7 @@
             </p:txBody>
           </p:sp>
         </mc:Choice>
-        <mc:Fallback>
+        <mc:Fallback xmlns="">
           <p:sp>
             <p:nvSpPr>
               <p:cNvPr id="118" name="TextBox 117">
@@ -5377,8 +5379,8 @@
           </p:sp>
         </mc:Fallback>
       </mc:AlternateContent>
-      <mc:AlternateContent xmlns:mc="http://schemas.openxmlformats.org/markup-compatibility/2006">
-        <mc:Choice xmlns:a14="http://schemas.microsoft.com/office/drawing/2010/main" Requires="a14">
+      <mc:AlternateContent xmlns:mc="http://schemas.openxmlformats.org/markup-compatibility/2006" xmlns:a14="http://schemas.microsoft.com/office/drawing/2010/main">
+        <mc:Choice Requires="a14">
           <p:sp>
             <p:nvSpPr>
               <p:cNvPr id="119" name="TextBox 118">
@@ -5407,6 +5409,7 @@
               </a:bodyPr>
               <a:lstStyle/>
               <a:p>
+                <a:pPr/>
                 <a14:m>
                   <m:oMathPara xmlns:m="http://schemas.openxmlformats.org/officeDocument/2006/math">
                     <m:oMathParaPr>
@@ -5447,7 +5450,7 @@
             </p:txBody>
           </p:sp>
         </mc:Choice>
-        <mc:Fallback>
+        <mc:Fallback xmlns="">
           <p:sp>
             <p:nvSpPr>
               <p:cNvPr id="119" name="TextBox 118">
@@ -5513,9 +5516,9 @@
             <a:avLst/>
           </a:prstGeom>
           <a:solidFill>
-            <a:srgbClr val="77E982">
+            <a:schemeClr val="accent5">
               <a:alpha val="50000"/>
-            </a:srgbClr>
+            </a:schemeClr>
           </a:solidFill>
           <a:ln>
             <a:noFill/>
@@ -5544,8 +5547,8 @@
           </a:p>
         </p:txBody>
       </p:sp>
-      <mc:AlternateContent xmlns:mc="http://schemas.openxmlformats.org/markup-compatibility/2006">
-        <mc:Choice xmlns:a14="http://schemas.microsoft.com/office/drawing/2010/main" Requires="a14">
+      <mc:AlternateContent xmlns:mc="http://schemas.openxmlformats.org/markup-compatibility/2006" xmlns:a14="http://schemas.microsoft.com/office/drawing/2010/main">
+        <mc:Choice Requires="a14">
           <p:sp>
             <p:nvSpPr>
               <p:cNvPr id="158" name="TextBox 157">
@@ -5584,8 +5587,8 @@
                       <m:sSub>
                         <m:sSubPr>
                           <m:ctrlPr>
-                            <a:rPr lang="en-US" smtClean="0">
-                              <a:latin typeface="Calibri (Body)"/>
+                            <a:rPr lang="en-US" i="1" smtClean="0">
+                              <a:latin typeface="Cambria Math" panose="02040503050406030204" pitchFamily="18" charset="0"/>
                             </a:rPr>
                           </m:ctrlPr>
                         </m:sSubPr>
@@ -5671,13 +5674,13 @@
                               <m:sty m:val="p"/>
                             </m:rPr>
                             <a:rPr lang="en-US" i="0">
-                              <a:latin typeface="Calibri (Body)"/>
+                              <a:latin typeface="Cambria Math" panose="02040503050406030204" pitchFamily="18" charset="0"/>
                             </a:rPr>
                             <m:t>t</m:t>
                           </m:r>
                           <m:r>
                             <a:rPr lang="en-US" b="0" i="0" smtClean="0">
-                              <a:latin typeface="Calibri (Body)"/>
+                              <a:latin typeface="Cambria Math" panose="02040503050406030204" pitchFamily="18" charset="0"/>
                             </a:rPr>
                             <m:t>+</m:t>
                           </m:r>
@@ -5686,7 +5689,7 @@
                               <m:sty m:val="p"/>
                             </m:rPr>
                             <a:rPr lang="en-US" b="0" i="0" smtClean="0">
-                              <a:latin typeface="Calibri (Body)"/>
+                              <a:latin typeface="Cambria Math" panose="02040503050406030204" pitchFamily="18" charset="0"/>
                             </a:rPr>
                             <m:t>n</m:t>
                           </m:r>
@@ -5694,7 +5697,7 @@
                       </m:sSub>
                       <m:r>
                         <a:rPr lang="en-US" b="0" i="0" smtClean="0">
-                          <a:latin typeface="Calibri (Body)"/>
+                          <a:latin typeface="Cambria Math" panose="02040503050406030204" pitchFamily="18" charset="0"/>
                         </a:rPr>
                         <m:t>)</m:t>
                       </m:r>
@@ -5708,7 +5711,7 @@
             </p:txBody>
           </p:sp>
         </mc:Choice>
-        <mc:Fallback>
+        <mc:Fallback xmlns="">
           <p:sp>
             <p:nvSpPr>
               <p:cNvPr id="158" name="TextBox 157">
@@ -6119,8 +6122,6 @@
           </a:prstGeom>
           <a:solidFill>
             <a:schemeClr val="accent5">
-              <a:lumMod val="60000"/>
-              <a:lumOff val="40000"/>
               <a:alpha val="50000"/>
             </a:schemeClr>
           </a:solidFill>
@@ -7429,9 +7430,9 @@
             <a:avLst/>
           </a:prstGeom>
           <a:solidFill>
-            <a:srgbClr val="FF8F8F">
+            <a:schemeClr val="accent5">
               <a:alpha val="50000"/>
-            </a:srgbClr>
+            </a:schemeClr>
           </a:solidFill>
           <a:ln>
             <a:noFill/>
@@ -7460,8 +7461,8 @@
           </a:p>
         </p:txBody>
       </p:sp>
-      <mc:AlternateContent xmlns:mc="http://schemas.openxmlformats.org/markup-compatibility/2006">
-        <mc:Choice xmlns:a14="http://schemas.microsoft.com/office/drawing/2010/main" Requires="a14">
+      <mc:AlternateContent xmlns:mc="http://schemas.openxmlformats.org/markup-compatibility/2006" xmlns:a14="http://schemas.microsoft.com/office/drawing/2010/main">
+        <mc:Choice Requires="a14">
           <p:sp>
             <p:nvSpPr>
               <p:cNvPr id="117" name="TextBox 116">
@@ -7531,7 +7532,7 @@
             </p:txBody>
           </p:sp>
         </mc:Choice>
-        <mc:Fallback>
+        <mc:Fallback xmlns="">
           <p:sp>
             <p:nvSpPr>
               <p:cNvPr id="117" name="TextBox 116">
@@ -7576,8 +7577,8 @@
           </p:sp>
         </mc:Fallback>
       </mc:AlternateContent>
-      <mc:AlternateContent xmlns:mc="http://schemas.openxmlformats.org/markup-compatibility/2006">
-        <mc:Choice xmlns:a14="http://schemas.microsoft.com/office/drawing/2010/main" Requires="a14">
+      <mc:AlternateContent xmlns:mc="http://schemas.openxmlformats.org/markup-compatibility/2006" xmlns:a14="http://schemas.microsoft.com/office/drawing/2010/main">
+        <mc:Choice Requires="a14">
           <p:sp>
             <p:nvSpPr>
               <p:cNvPr id="118" name="TextBox 117">
@@ -7647,7 +7648,7 @@
             </p:txBody>
           </p:sp>
         </mc:Choice>
-        <mc:Fallback>
+        <mc:Fallback xmlns="">
           <p:sp>
             <p:nvSpPr>
               <p:cNvPr id="118" name="TextBox 117">
@@ -7692,8 +7693,8 @@
           </p:sp>
         </mc:Fallback>
       </mc:AlternateContent>
-      <mc:AlternateContent xmlns:mc="http://schemas.openxmlformats.org/markup-compatibility/2006">
-        <mc:Choice xmlns:a14="http://schemas.microsoft.com/office/drawing/2010/main" Requires="a14">
+      <mc:AlternateContent xmlns:mc="http://schemas.openxmlformats.org/markup-compatibility/2006" xmlns:a14="http://schemas.microsoft.com/office/drawing/2010/main">
+        <mc:Choice Requires="a14">
           <p:sp>
             <p:nvSpPr>
               <p:cNvPr id="119" name="TextBox 118">
@@ -7763,7 +7764,7 @@
             </p:txBody>
           </p:sp>
         </mc:Choice>
-        <mc:Fallback>
+        <mc:Fallback xmlns="">
           <p:sp>
             <p:nvSpPr>
               <p:cNvPr id="119" name="TextBox 118">
@@ -7829,9 +7830,9 @@
             <a:avLst/>
           </a:prstGeom>
           <a:solidFill>
-            <a:srgbClr val="77E982">
+            <a:schemeClr val="accent5">
               <a:alpha val="50000"/>
-            </a:srgbClr>
+            </a:schemeClr>
           </a:solidFill>
           <a:ln>
             <a:noFill/>
@@ -7860,8 +7861,8 @@
           </a:p>
         </p:txBody>
       </p:sp>
-      <mc:AlternateContent xmlns:mc="http://schemas.openxmlformats.org/markup-compatibility/2006">
-        <mc:Choice xmlns:a14="http://schemas.microsoft.com/office/drawing/2010/main" Requires="a14">
+      <mc:AlternateContent xmlns:mc="http://schemas.openxmlformats.org/markup-compatibility/2006" xmlns:a14="http://schemas.microsoft.com/office/drawing/2010/main">
+        <mc:Choice Requires="a14">
           <p:sp>
             <p:nvSpPr>
               <p:cNvPr id="158" name="TextBox 157">
@@ -7912,7 +7913,7 @@
             </p:txBody>
           </p:sp>
         </mc:Choice>
-        <mc:Fallback>
+        <mc:Fallback xmlns="">
           <p:sp>
             <p:nvSpPr>
               <p:cNvPr id="158" name="TextBox 157">
@@ -8323,8 +8324,6 @@
           </a:prstGeom>
           <a:solidFill>
             <a:schemeClr val="accent5">
-              <a:lumMod val="60000"/>
-              <a:lumOff val="40000"/>
               <a:alpha val="50000"/>
             </a:schemeClr>
           </a:solidFill>

</xml_diff>